<commit_message>
fixed mac os warning, error message last slide version
</commit_message>
<xml_diff>
--- a/conf4j-slides/Devops_Configuration_Jungle_Devoxx_FR_2012.pptx
+++ b/conf4j-slides/Devops_Configuration_Jungle_Devoxx_FR_2012.pptx
@@ -6,10 +6,10 @@
     <p:sldMasterId id="2147483675" r:id="rId2"/>
   </p:sldMasterIdLst>
   <p:notesMasterIdLst>
-    <p:notesMasterId r:id="rId18"/>
+    <p:notesMasterId r:id="rId19"/>
   </p:notesMasterIdLst>
   <p:handoutMasterIdLst>
-    <p:handoutMasterId r:id="rId19"/>
+    <p:handoutMasterId r:id="rId20"/>
   </p:handoutMasterIdLst>
   <p:sldIdLst>
     <p:sldId id="256" r:id="rId3"/>
@@ -21,12 +21,13 @@
     <p:sldId id="274" r:id="rId9"/>
     <p:sldId id="276" r:id="rId10"/>
     <p:sldId id="288" r:id="rId11"/>
-    <p:sldId id="306" r:id="rId12"/>
-    <p:sldId id="300" r:id="rId13"/>
-    <p:sldId id="305" r:id="rId14"/>
-    <p:sldId id="304" r:id="rId15"/>
-    <p:sldId id="258" r:id="rId16"/>
-    <p:sldId id="283" r:id="rId17"/>
+    <p:sldId id="307" r:id="rId12"/>
+    <p:sldId id="306" r:id="rId13"/>
+    <p:sldId id="300" r:id="rId14"/>
+    <p:sldId id="305" r:id="rId15"/>
+    <p:sldId id="304" r:id="rId16"/>
+    <p:sldId id="258" r:id="rId17"/>
+    <p:sldId id="283" r:id="rId18"/>
   </p:sldIdLst>
   <p:sldSz cx="16256000" cy="9144000"/>
   <p:notesSz cx="9296400" cy="16891000"/>
@@ -6545,6 +6546,84 @@
       </p:grpSpPr>
       <p:sp>
         <p:nvSpPr>
+          <p:cNvPr id="2" name="Titre 1"/>
+          <p:cNvSpPr>
+            <a:spLocks noGrp="1"/>
+          </p:cNvSpPr>
+          <p:nvPr>
+            <p:ph type="title"/>
+          </p:nvPr>
+        </p:nvSpPr>
+        <p:spPr/>
+        <p:txBody>
+          <a:bodyPr/>
+          <a:lstStyle/>
+          <a:p>
+            <a:r>
+              <a:rPr lang="fr-FR" dirty="0" smtClean="0"/>
+              <a:t>Action !</a:t>
+            </a:r>
+            <a:endParaRPr lang="fr-FR" dirty="0"/>
+          </a:p>
+        </p:txBody>
+      </p:sp>
+      <p:sp>
+        <p:nvSpPr>
+          <p:cNvPr id="4" name="Espace réservé du numéro de diapositive 3"/>
+          <p:cNvSpPr>
+            <a:spLocks noGrp="1"/>
+          </p:cNvSpPr>
+          <p:nvPr>
+            <p:ph type="sldNum" sz="quarter" idx="10"/>
+          </p:nvPr>
+        </p:nvSpPr>
+        <p:spPr/>
+        <p:txBody>
+          <a:bodyPr/>
+          <a:lstStyle/>
+          <a:p>
+            <a:fld id="{86877393-B807-E74C-BF13-191E06FF98B8}" type="slidenum">
+              <a:rPr lang="en-US" smtClean="0"/>
+              <a:pPr/>
+              <a:t>10</a:t>
+            </a:fld>
+            <a:endParaRPr lang="en-US"/>
+          </a:p>
+        </p:txBody>
+      </p:sp>
+    </p:spTree>
+    <p:extLst>
+      <p:ext uri="{BB962C8B-B14F-4D97-AF65-F5344CB8AC3E}">
+        <p14:creationId xmlns:p14="http://schemas.microsoft.com/office/powerpoint/2010/main" val="468642124"/>
+      </p:ext>
+    </p:extLst>
+  </p:cSld>
+  <p:clrMapOvr>
+    <a:masterClrMapping/>
+  </p:clrMapOvr>
+  <p:transition xmlns:p14="http://schemas.microsoft.com/office/powerpoint/2010/main"/>
+</p:sld>
+</file>
+
+<file path=ppt/slides/slide11.xml><?xml version="1.0" encoding="utf-8"?>
+<p:sld xmlns:a="http://schemas.openxmlformats.org/drawingml/2006/main" xmlns:r="http://schemas.openxmlformats.org/officeDocument/2006/relationships" xmlns:p="http://schemas.openxmlformats.org/presentationml/2006/main">
+  <p:cSld>
+    <p:spTree>
+      <p:nvGrpSpPr>
+        <p:cNvPr id="1" name=""/>
+        <p:cNvGrpSpPr/>
+        <p:nvPr/>
+      </p:nvGrpSpPr>
+      <p:grpSpPr>
+        <a:xfrm>
+          <a:off x="0" y="0"/>
+          <a:ext cx="0" cy="0"/>
+          <a:chOff x="0" y="0"/>
+          <a:chExt cx="0" cy="0"/>
+        </a:xfrm>
+      </p:grpSpPr>
+      <p:sp>
+        <p:nvSpPr>
           <p:cNvPr id="12" name="Rectangle 11"/>
           <p:cNvSpPr/>
           <p:nvPr/>
@@ -7487,7 +7566,7 @@
 </p:sld>
 </file>
 
-<file path=ppt/slides/slide11.xml><?xml version="1.0" encoding="utf-8"?>
+<file path=ppt/slides/slide12.xml><?xml version="1.0" encoding="utf-8"?>
 <p:sld xmlns:a="http://schemas.openxmlformats.org/drawingml/2006/main" xmlns:r="http://schemas.openxmlformats.org/officeDocument/2006/relationships" xmlns:p="http://schemas.openxmlformats.org/presentationml/2006/main">
   <p:cSld>
     <p:spTree>
@@ -7716,7 +7795,7 @@
             <a:fld id="{696D643C-9C83-8844-B980-2CD28B8C96AE}" type="slidenum">
               <a:rPr lang="en-US"/>
               <a:pPr/>
-              <a:t>11</a:t>
+              <a:t>12</a:t>
             </a:fld>
             <a:endParaRPr lang="en-US"/>
           </a:p>
@@ -7768,7 +7847,7 @@
 </p:sld>
 </file>
 
-<file path=ppt/slides/slide12.xml><?xml version="1.0" encoding="utf-8"?>
+<file path=ppt/slides/slide13.xml><?xml version="1.0" encoding="utf-8"?>
 <p:sld xmlns:a="http://schemas.openxmlformats.org/drawingml/2006/main" xmlns:r="http://schemas.openxmlformats.org/officeDocument/2006/relationships" xmlns:p="http://schemas.openxmlformats.org/presentationml/2006/main">
   <p:cSld>
     <p:spTree>
@@ -7803,7 +7882,7 @@
             <a:fld id="{86877393-B807-E74C-BF13-191E06FF98B8}" type="slidenum">
               <a:rPr lang="en-US" smtClean="0"/>
               <a:pPr/>
-              <a:t>12</a:t>
+              <a:t>13</a:t>
             </a:fld>
             <a:endParaRPr lang="en-US"/>
           </a:p>
@@ -8362,7 +8441,7 @@
 </p:sld>
 </file>
 
-<file path=ppt/slides/slide13.xml><?xml version="1.0" encoding="utf-8"?>
+<file path=ppt/slides/slide14.xml><?xml version="1.0" encoding="utf-8"?>
 <p:sld xmlns:a="http://schemas.openxmlformats.org/drawingml/2006/main" xmlns:r="http://schemas.openxmlformats.org/officeDocument/2006/relationships" xmlns:p="http://schemas.openxmlformats.org/presentationml/2006/main">
   <p:cSld>
     <p:spTree>
@@ -8397,7 +8476,7 @@
             <a:fld id="{86877393-B807-E74C-BF13-191E06FF98B8}" type="slidenum">
               <a:rPr lang="en-US" smtClean="0"/>
               <a:pPr/>
-              <a:t>13</a:t>
+              <a:t>14</a:t>
             </a:fld>
             <a:endParaRPr lang="en-US"/>
           </a:p>
@@ -8528,88 +8607,6 @@
         <p14:creationId xmlns:p14="http://schemas.microsoft.com/office/powerpoint/2010/main" val="2029987233"/>
       </p:ext>
     </p:extLst>
-  </p:cSld>
-  <p:clrMapOvr>
-    <a:masterClrMapping/>
-  </p:clrMapOvr>
-  <p:transition xmlns:p14="http://schemas.microsoft.com/office/powerpoint/2010/main"/>
-  <p:timing>
-    <p:tnLst>
-      <p:par>
-        <p:cTn xmlns:p14="http://schemas.microsoft.com/office/powerpoint/2010/main" id="1" dur="indefinite" restart="never" nodeType="tmRoot"/>
-      </p:par>
-    </p:tnLst>
-  </p:timing>
-</p:sld>
-</file>
-
-<file path=ppt/slides/slide14.xml><?xml version="1.0" encoding="utf-8"?>
-<p:sld xmlns:a="http://schemas.openxmlformats.org/drawingml/2006/main" xmlns:r="http://schemas.openxmlformats.org/officeDocument/2006/relationships" xmlns:p="http://schemas.openxmlformats.org/presentationml/2006/main">
-  <p:cSld>
-    <p:spTree>
-      <p:nvGrpSpPr>
-        <p:cNvPr id="1" name=""/>
-        <p:cNvGrpSpPr/>
-        <p:nvPr/>
-      </p:nvGrpSpPr>
-      <p:grpSpPr>
-        <a:xfrm>
-          <a:off x="0" y="0"/>
-          <a:ext cx="0" cy="0"/>
-          <a:chOff x="0" y="0"/>
-          <a:chExt cx="0" cy="0"/>
-        </a:xfrm>
-      </p:grpSpPr>
-      <p:sp>
-        <p:nvSpPr>
-          <p:cNvPr id="28673" name="Rectangle 1"/>
-          <p:cNvSpPr>
-            <a:spLocks noGrp="1" noChangeArrowheads="1"/>
-          </p:cNvSpPr>
-          <p:nvPr>
-            <p:ph type="title"/>
-          </p:nvPr>
-        </p:nvSpPr>
-        <p:spPr>
-          <a:ln/>
-        </p:spPr>
-        <p:txBody>
-          <a:bodyPr/>
-          <a:lstStyle/>
-          <a:p>
-            <a:r>
-              <a:rPr lang="en-US" dirty="0" err="1"/>
-              <a:t>Démo</a:t>
-            </a:r>
-            <a:endParaRPr lang="en-US" dirty="0"/>
-          </a:p>
-        </p:txBody>
-      </p:sp>
-      <p:sp>
-        <p:nvSpPr>
-          <p:cNvPr id="4" name="Espace réservé du numéro de diapositive 3"/>
-          <p:cNvSpPr>
-            <a:spLocks noGrp="1"/>
-          </p:cNvSpPr>
-          <p:nvPr>
-            <p:ph type="sldNum" sz="quarter" idx="10"/>
-          </p:nvPr>
-        </p:nvSpPr>
-        <p:spPr/>
-        <p:txBody>
-          <a:bodyPr/>
-          <a:lstStyle/>
-          <a:p>
-            <a:fld id="{3FC59908-7454-5F48-A576-CE999BD31359}" type="slidenum">
-              <a:rPr lang="en-US"/>
-              <a:pPr/>
-              <a:t>14</a:t>
-            </a:fld>
-            <a:endParaRPr lang="en-US"/>
-          </a:p>
-        </p:txBody>
-      </p:sp>
-    </p:spTree>
   </p:cSld>
   <p:clrMapOvr>
     <a:masterClrMapping/>
@@ -8644,6 +8641,88 @@
       </p:grpSpPr>
       <p:sp>
         <p:nvSpPr>
+          <p:cNvPr id="28673" name="Rectangle 1"/>
+          <p:cNvSpPr>
+            <a:spLocks noGrp="1" noChangeArrowheads="1"/>
+          </p:cNvSpPr>
+          <p:nvPr>
+            <p:ph type="title"/>
+          </p:nvPr>
+        </p:nvSpPr>
+        <p:spPr>
+          <a:ln/>
+        </p:spPr>
+        <p:txBody>
+          <a:bodyPr/>
+          <a:lstStyle/>
+          <a:p>
+            <a:r>
+              <a:rPr lang="en-US" dirty="0" err="1"/>
+              <a:t>Démo</a:t>
+            </a:r>
+            <a:endParaRPr lang="en-US" dirty="0"/>
+          </a:p>
+        </p:txBody>
+      </p:sp>
+      <p:sp>
+        <p:nvSpPr>
+          <p:cNvPr id="4" name="Espace réservé du numéro de diapositive 3"/>
+          <p:cNvSpPr>
+            <a:spLocks noGrp="1"/>
+          </p:cNvSpPr>
+          <p:nvPr>
+            <p:ph type="sldNum" sz="quarter" idx="10"/>
+          </p:nvPr>
+        </p:nvSpPr>
+        <p:spPr/>
+        <p:txBody>
+          <a:bodyPr/>
+          <a:lstStyle/>
+          <a:p>
+            <a:fld id="{3FC59908-7454-5F48-A576-CE999BD31359}" type="slidenum">
+              <a:rPr lang="en-US"/>
+              <a:pPr/>
+              <a:t>15</a:t>
+            </a:fld>
+            <a:endParaRPr lang="en-US"/>
+          </a:p>
+        </p:txBody>
+      </p:sp>
+    </p:spTree>
+  </p:cSld>
+  <p:clrMapOvr>
+    <a:masterClrMapping/>
+  </p:clrMapOvr>
+  <p:transition xmlns:p14="http://schemas.microsoft.com/office/powerpoint/2010/main"/>
+  <p:timing>
+    <p:tnLst>
+      <p:par>
+        <p:cTn xmlns:p14="http://schemas.microsoft.com/office/powerpoint/2010/main" id="1" dur="indefinite" restart="never" nodeType="tmRoot"/>
+      </p:par>
+    </p:tnLst>
+  </p:timing>
+</p:sld>
+</file>
+
+<file path=ppt/slides/slide16.xml><?xml version="1.0" encoding="utf-8"?>
+<p:sld xmlns:a="http://schemas.openxmlformats.org/drawingml/2006/main" xmlns:r="http://schemas.openxmlformats.org/officeDocument/2006/relationships" xmlns:p="http://schemas.openxmlformats.org/presentationml/2006/main">
+  <p:cSld>
+    <p:spTree>
+      <p:nvGrpSpPr>
+        <p:cNvPr id="1" name=""/>
+        <p:cNvGrpSpPr/>
+        <p:nvPr/>
+      </p:nvGrpSpPr>
+      <p:grpSpPr>
+        <a:xfrm>
+          <a:off x="0" y="0"/>
+          <a:ext cx="0" cy="0"/>
+          <a:chOff x="0" y="0"/>
+          <a:chExt cx="0" cy="0"/>
+        </a:xfrm>
+      </p:grpSpPr>
+      <p:sp>
+        <p:nvSpPr>
           <p:cNvPr id="3" name="Espace réservé du numéro de diapositive 3"/>
           <p:cNvSpPr>
             <a:spLocks noGrp="1"/>
@@ -8660,7 +8739,7 @@
             <a:fld id="{491EF83F-DC3D-2B41-8CED-EDA4CF3DA041}" type="slidenum">
               <a:rPr lang="en-US"/>
               <a:pPr/>
-              <a:t>15</a:t>
+              <a:t>16</a:t>
             </a:fld>
             <a:endParaRPr lang="en-US"/>
           </a:p>

</xml_diff>